<commit_message>
Chapter on JDBC updated.
</commit_message>
<xml_diff>
--- a/02. Java Enterprise/Slides/02. JDBC.pptx
+++ b/02. Java Enterprise/Slides/02. JDBC.pptx
@@ -226,7 +226,7 @@
           <a:p>
             <a:fld id="{59041DB8-B66F-4DC8-A96E-33677E0F90FF}" type="datetimeFigureOut">
               <a:rPr lang="en-US" smtClean="0"/>
-              <a:t>3/24/2015</a:t>
+              <a:t>3/26/2015</a:t>
             </a:fld>
             <a:endParaRPr lang="en-US"/>
           </a:p>
@@ -391,7 +391,7 @@
           <a:p>
             <a:fld id="{DEB49C4A-65AC-492D-9701-81B46C3AD0E4}" type="datetimeFigureOut">
               <a:rPr lang="en-US" smtClean="0"/>
-              <a:t>3/24/2015</a:t>
+              <a:t>3/26/2015</a:t>
             </a:fld>
             <a:endParaRPr lang="en-US"/>
           </a:p>
@@ -4913,7 +4913,7 @@
           <a:p>
             <a:fld id="{384A29A4-78C8-47AB-BA06-22CB45938951}" type="datetime1">
               <a:rPr lang="en-US" smtClean="0"/>
-              <a:t>3/24/2015</a:t>
+              <a:t>3/26/2015</a:t>
             </a:fld>
             <a:endParaRPr lang="en-US"/>
           </a:p>
@@ -5108,7 +5108,7 @@
           <a:p>
             <a:fld id="{E1ED4ACF-2D82-46F2-A8E9-23963AA34E86}" type="datetime1">
               <a:rPr lang="en-US" smtClean="0"/>
-              <a:t>3/24/2015</a:t>
+              <a:t>3/26/2015</a:t>
             </a:fld>
             <a:endParaRPr lang="en-US"/>
           </a:p>
@@ -5301,7 +5301,7 @@
           <a:p>
             <a:fld id="{AE374B5B-21A0-4192-BF4C-38187F1A68D8}" type="datetime1">
               <a:rPr lang="en-US" smtClean="0"/>
-              <a:t>3/24/2015</a:t>
+              <a:t>3/26/2015</a:t>
             </a:fld>
             <a:endParaRPr lang="en-US"/>
           </a:p>
@@ -5492,7 +5492,7 @@
           <a:p>
             <a:fld id="{AE374B5B-21A0-4192-BF4C-38187F1A68D8}" type="datetime1">
               <a:rPr lang="en-US" smtClean="0"/>
-              <a:t>3/24/2015</a:t>
+              <a:t>3/26/2015</a:t>
             </a:fld>
             <a:endParaRPr lang="en-US"/>
           </a:p>
@@ -7790,7 +7790,7 @@
           <a:p>
             <a:fld id="{33B5CF7C-B333-48E1-A4A6-83A3C8B73AC0}" type="datetime1">
               <a:rPr lang="en-US" smtClean="0"/>
-              <a:t>3/24/2015</a:t>
+              <a:t>3/26/2015</a:t>
             </a:fld>
             <a:endParaRPr lang="en-US"/>
           </a:p>
@@ -8245,7 +8245,7 @@
           <a:p>
             <a:fld id="{AE320762-5CBF-4210-AB54-376B091119F8}" type="datetime1">
               <a:rPr lang="en-US" smtClean="0"/>
-              <a:t>3/24/2015</a:t>
+              <a:t>3/26/2015</a:t>
             </a:fld>
             <a:endParaRPr lang="en-US"/>
           </a:p>
@@ -8378,7 +8378,7 @@
           <a:p>
             <a:fld id="{7F0DB371-BF5F-4058-A212-1A908E4D2674}" type="datetime1">
               <a:rPr lang="en-US" smtClean="0"/>
-              <a:t>3/24/2015</a:t>
+              <a:t>3/26/2015</a:t>
             </a:fld>
             <a:endParaRPr lang="en-US"/>
           </a:p>
@@ -10311,7 +10311,7 @@
           <a:p>
             <a:fld id="{60A4083B-90AA-48CF-BAD5-00AA24D7F288}" type="datetime1">
               <a:rPr lang="en-US" smtClean="0"/>
-              <a:t>3/24/2015</a:t>
+              <a:t>3/26/2015</a:t>
             </a:fld>
             <a:endParaRPr lang="en-US"/>
           </a:p>
@@ -14566,7 +14566,7 @@
           <a:p>
             <a:fld id="{B51B2453-8663-4C69-AF73-9FD7B1DEC5D0}" type="datetime1">
               <a:rPr lang="en-US" smtClean="0"/>
-              <a:t>3/24/2015</a:t>
+              <a:t>3/26/2015</a:t>
             </a:fld>
             <a:endParaRPr lang="en-US"/>
           </a:p>
@@ -15444,11 +15444,7 @@
           <a:p>
             <a:r>
               <a:rPr lang="en-US" dirty="0" smtClean="0"/>
-              <a:t>Exercise: </a:t>
-            </a:r>
-            <a:r>
-              <a:rPr lang="en-US" dirty="0" smtClean="0"/>
-              <a:t>Library</a:t>
+              <a:t>Exercise: Library</a:t>
             </a:r>
             <a:endParaRPr lang="en-US" dirty="0"/>
           </a:p>
@@ -15524,32 +15520,11 @@
             </a:pPr>
             <a:r>
               <a:rPr lang="en-US" dirty="0" smtClean="0"/>
-              <a:t>Use JDBC to store the data in a </a:t>
-            </a:r>
-            <a:r>
-              <a:rPr lang="en-US" dirty="0"/>
-              <a:t>relational </a:t>
+              <a:t>Use JDBC to store the data in </a:t>
             </a:r>
             <a:r>
               <a:rPr lang="en-US" dirty="0" smtClean="0"/>
-              <a:t>database.</a:t>
-            </a:r>
-          </a:p>
-          <a:p>
-            <a:pPr marL="0" indent="0">
-              <a:buNone/>
-            </a:pPr>
-            <a:r>
-              <a:rPr lang="en-US" dirty="0" smtClean="0"/>
-              <a:t>Use </a:t>
-            </a:r>
-            <a:r>
-              <a:rPr lang="en-US" dirty="0"/>
-              <a:t>the “book” table created in the previous </a:t>
-            </a:r>
-            <a:r>
-              <a:rPr lang="en-US" dirty="0" smtClean="0"/>
-              <a:t>exercise.</a:t>
+              <a:t>the “book” table created in the previous exercise.</a:t>
             </a:r>
             <a:endParaRPr lang="en-US" dirty="0" smtClean="0"/>
           </a:p>
@@ -15610,7 +15585,7 @@
           <a:p>
             <a:r>
               <a:rPr lang="en-US" dirty="0" smtClean="0"/>
-              <a:t>Exercise: </a:t>
+              <a:t>Application: </a:t>
             </a:r>
             <a:r>
               <a:rPr lang="en-US" dirty="0" err="1" smtClean="0"/>
@@ -15640,15 +15615,31 @@
             </a:pPr>
             <a:r>
               <a:rPr lang="en-US" dirty="0" smtClean="0"/>
-              <a:t>Provide a second implementation for the warehouse module that uses JDBC to persist the data in a relational database rather than storing it </a:t>
+              <a:t>Provide a second implementation for the </a:t>
             </a:r>
             <a:r>
               <a:rPr lang="en-US" dirty="0" smtClean="0"/>
-              <a:t>in memory</a:t>
+              <a:t>data access component(s) of the warehouse </a:t>
             </a:r>
             <a:r>
               <a:rPr lang="en-US" dirty="0" smtClean="0"/>
-              <a:t>.</a:t>
+              <a:t>module that uses JDBC to </a:t>
+            </a:r>
+            <a:r>
+              <a:rPr lang="en-US" dirty="0" smtClean="0"/>
+              <a:t>store the products in </a:t>
+            </a:r>
+            <a:r>
+              <a:rPr lang="en-US" dirty="0" smtClean="0"/>
+              <a:t>a relational database rather than </a:t>
+            </a:r>
+            <a:r>
+              <a:rPr lang="en-US" dirty="0" smtClean="0"/>
+              <a:t>in </a:t>
+            </a:r>
+            <a:r>
+              <a:rPr lang="en-US" dirty="0" smtClean="0"/>
+              <a:t>memory.</a:t>
             </a:r>
           </a:p>
           <a:p>
@@ -15657,7 +15648,15 @@
             </a:pPr>
             <a:r>
               <a:rPr lang="en-US" dirty="0" smtClean="0"/>
-              <a:t>Control which implementation (in-memory or relational database) the application uses through a static constant in the “main” application class.</a:t>
+              <a:t>Control which implementation (in-memory or relational database) the application uses </a:t>
+            </a:r>
+            <a:r>
+              <a:rPr lang="en-US" dirty="0" smtClean="0"/>
+              <a:t>in </a:t>
+            </a:r>
+            <a:r>
+              <a:rPr lang="en-US" dirty="0" smtClean="0"/>
+              <a:t>the “main” application class.</a:t>
             </a:r>
             <a:endParaRPr lang="en-US" dirty="0"/>
           </a:p>
@@ -16813,17 +16812,7 @@
                   </a:schemeClr>
                 </a:solidFill>
               </a:rPr>
-              <a:t>into </a:t>
-            </a:r>
-            <a:r>
-              <a:rPr lang="en-US" dirty="0" smtClean="0">
-                <a:solidFill>
-                  <a:schemeClr val="accent1">
-                    <a:lumMod val="50000"/>
-                  </a:schemeClr>
-                </a:solidFill>
-              </a:rPr>
-              <a:t>book(</a:t>
+              <a:t>into book(</a:t>
             </a:r>
             <a:r>
               <a:rPr lang="en-US" dirty="0" err="1" smtClean="0">
@@ -16904,17 +16893,7 @@
                   </a:schemeClr>
                 </a:solidFill>
               </a:rPr>
-              <a:t>, </a:t>
-            </a:r>
-            <a:r>
-              <a:rPr lang="en-US" dirty="0">
-                <a:solidFill>
-                  <a:schemeClr val="accent1">
-                    <a:lumMod val="50000"/>
-                  </a:schemeClr>
-                </a:solidFill>
-              </a:rPr>
-              <a:t>"</a:t>
+              <a:t>, "</a:t>
             </a:r>
             <a:r>
               <a:rPr lang="en-US" dirty="0" smtClean="0">
@@ -17136,13 +17115,6 @@
               </a:rPr>
               <a:t>();</a:t>
             </a:r>
-            <a:endParaRPr lang="en-US" dirty="0" smtClean="0">
-              <a:solidFill>
-                <a:schemeClr val="accent1">
-                  <a:lumMod val="50000"/>
-                </a:schemeClr>
-              </a:solidFill>
-            </a:endParaRPr>
           </a:p>
           <a:p>
             <a:endParaRPr lang="en-US" dirty="0" smtClean="0">
@@ -17402,17 +17374,7 @@
                   </a:schemeClr>
                 </a:solidFill>
               </a:rPr>
-              <a:t>, </a:t>
-            </a:r>
-            <a:r>
-              <a:rPr lang="en-US" dirty="0" smtClean="0">
-                <a:solidFill>
-                  <a:schemeClr val="accent1">
-                    <a:lumMod val="50000"/>
-                  </a:schemeClr>
-                </a:solidFill>
-              </a:rPr>
-              <a:t>'E Title')");</a:t>
+              <a:t>, 'E Title')");</a:t>
             </a:r>
             <a:endParaRPr lang="en-US" dirty="0">
               <a:solidFill>
@@ -17491,17 +17453,7 @@
                   </a:schemeClr>
                 </a:solidFill>
               </a:rPr>
-              <a:t>('F', </a:t>
-            </a:r>
-            <a:r>
-              <a:rPr lang="en-US" dirty="0" smtClean="0">
-                <a:solidFill>
-                  <a:schemeClr val="accent1">
-                    <a:lumMod val="50000"/>
-                  </a:schemeClr>
-                </a:solidFill>
-              </a:rPr>
-              <a:t>'F Title')");</a:t>
+              <a:t>('F', 'F Title')");</a:t>
             </a:r>
             <a:endParaRPr lang="en-US" dirty="0">
               <a:solidFill>
@@ -17910,17 +17862,7 @@
                   </a:schemeClr>
                 </a:solidFill>
               </a:rPr>
-              <a:t>, </a:t>
-            </a:r>
-            <a:r>
-              <a:rPr lang="en-US" dirty="0">
-                <a:solidFill>
-                  <a:schemeClr val="accent1">
-                    <a:lumMod val="50000"/>
-                  </a:schemeClr>
-                </a:solidFill>
-              </a:rPr>
-              <a:t>"</a:t>
+              <a:t>, "</a:t>
             </a:r>
             <a:r>
               <a:rPr lang="en-US" dirty="0" smtClean="0">
@@ -17942,13 +17884,6 @@
               </a:rPr>
               <a:t>");</a:t>
             </a:r>
-            <a:endParaRPr lang="en-US" dirty="0">
-              <a:solidFill>
-                <a:schemeClr val="accent1">
-                  <a:lumMod val="50000"/>
-                </a:schemeClr>
-              </a:solidFill>
-            </a:endParaRPr>
           </a:p>
           <a:p>
             <a:r>
@@ -17979,17 +17914,7 @@
                   </a:schemeClr>
                 </a:solidFill>
               </a:rPr>
-              <a:t>, </a:t>
-            </a:r>
-            <a:r>
-              <a:rPr lang="en-US" dirty="0">
-                <a:solidFill>
-                  <a:schemeClr val="accent1">
-                    <a:lumMod val="50000"/>
-                  </a:schemeClr>
-                </a:solidFill>
-              </a:rPr>
-              <a:t>"H </a:t>
+              <a:t>, "H </a:t>
             </a:r>
             <a:r>
               <a:rPr lang="en-US" dirty="0" smtClean="0">
@@ -18352,17 +18277,7 @@
                   </a:schemeClr>
                 </a:solidFill>
               </a:rPr>
-              <a:t>    </a:t>
-            </a:r>
-            <a:r>
-              <a:rPr lang="en-US" dirty="0" smtClean="0">
-                <a:solidFill>
-                  <a:schemeClr val="accent1">
-                    <a:lumMod val="50000"/>
-                  </a:schemeClr>
-                </a:solidFill>
-              </a:rPr>
-              <a:t>Long id </a:t>
+              <a:t>    Long id </a:t>
             </a:r>
             <a:r>
               <a:rPr lang="en-US" dirty="0">
@@ -18483,17 +18398,7 @@
                   </a:schemeClr>
                 </a:solidFill>
               </a:rPr>
-              <a:t>    String </a:t>
-            </a:r>
-            <a:r>
-              <a:rPr lang="en-US" dirty="0" smtClean="0">
-                <a:solidFill>
-                  <a:schemeClr val="accent1">
-                    <a:lumMod val="50000"/>
-                  </a:schemeClr>
-                </a:solidFill>
-              </a:rPr>
-              <a:t>title = </a:t>
+              <a:t>    String title = </a:t>
             </a:r>
             <a:r>
               <a:rPr lang="en-US" dirty="0" err="1">

</xml_diff>